<commit_message>
Änderung der Präsentation und Diagramme
</commit_message>
<xml_diff>
--- a/doc/slides.pptx
+++ b/doc/slides.pptx
@@ -2,7 +2,7 @@
 <file path=ppt/presentation.xml><?xml version="1.0" encoding="utf-8"?>
 <p:presentation xmlns:a="http://schemas.openxmlformats.org/drawingml/2006/main" xmlns:r="http://schemas.openxmlformats.org/officeDocument/2006/relationships" xmlns:p="http://schemas.openxmlformats.org/presentationml/2006/main" showSpecialPlsOnTitleSld="0" autoCompressPictures="0">
   <p:sldMasterIdLst>
-    <p:sldMasterId id="2147483767" r:id="rId1"/>
+    <p:sldMasterId id="2147484088" r:id="rId1"/>
   </p:sldMasterIdLst>
   <p:notesMasterIdLst>
     <p:notesMasterId r:id="rId13"/>
@@ -12,12 +12,12 @@
     <p:sldId id="257" r:id="rId3"/>
     <p:sldId id="258" r:id="rId4"/>
     <p:sldId id="260" r:id="rId5"/>
-    <p:sldId id="261" r:id="rId6"/>
-    <p:sldId id="262" r:id="rId7"/>
-    <p:sldId id="263" r:id="rId8"/>
-    <p:sldId id="267" r:id="rId9"/>
-    <p:sldId id="264" r:id="rId10"/>
-    <p:sldId id="265" r:id="rId11"/>
+    <p:sldId id="268" r:id="rId6"/>
+    <p:sldId id="261" r:id="rId7"/>
+    <p:sldId id="262" r:id="rId8"/>
+    <p:sldId id="263" r:id="rId9"/>
+    <p:sldId id="267" r:id="rId10"/>
+    <p:sldId id="264" r:id="rId11"/>
     <p:sldId id="266" r:id="rId12"/>
   </p:sldIdLst>
   <p:sldSz cx="12192000" cy="6858000"/>
@@ -126,12 +126,12 @@
             <p14:sldId id="257"/>
             <p14:sldId id="258"/>
             <p14:sldId id="260"/>
+            <p14:sldId id="268"/>
             <p14:sldId id="261"/>
             <p14:sldId id="262"/>
             <p14:sldId id="263"/>
             <p14:sldId id="267"/>
             <p14:sldId id="264"/>
-            <p14:sldId id="265"/>
             <p14:sldId id="266"/>
           </p14:sldIdLst>
         </p14:section>
@@ -226,7 +226,7 @@
           <a:p>
             <a:fld id="{4E797B24-1D95-4577-A43C-A1D0C1A024AB}" type="datetimeFigureOut">
               <a:rPr lang="de-DE" smtClean="0"/>
-              <a:t>06.03.2014</a:t>
+              <a:t>07.03.2014</a:t>
             </a:fld>
             <a:endParaRPr lang="de-DE"/>
           </a:p>
@@ -521,7 +521,101 @@
             <p:ph type="sldImg"/>
           </p:nvPr>
         </p:nvSpPr>
-        <p:spPr/>
+        <p:spPr>
+          <a:xfrm>
+            <a:off x="685800" y="1143000"/>
+            <a:ext cx="5486400" cy="3086100"/>
+          </a:xfrm>
+        </p:spPr>
+      </p:sp>
+      <p:sp>
+        <p:nvSpPr>
+          <p:cNvPr id="3" name="Notizenplatzhalter 2"/>
+          <p:cNvSpPr>
+            <a:spLocks noGrp="1"/>
+          </p:cNvSpPr>
+          <p:nvPr>
+            <p:ph type="body" idx="1"/>
+          </p:nvPr>
+        </p:nvSpPr>
+        <p:spPr/>
+        <p:txBody>
+          <a:bodyPr/>
+          <a:lstStyle/>
+          <a:p>
+            <a:endParaRPr lang="de-DE"/>
+          </a:p>
+        </p:txBody>
+      </p:sp>
+      <p:sp>
+        <p:nvSpPr>
+          <p:cNvPr id="4" name="Foliennummernplatzhalter 3"/>
+          <p:cNvSpPr>
+            <a:spLocks noGrp="1"/>
+          </p:cNvSpPr>
+          <p:nvPr>
+            <p:ph type="sldNum" sz="quarter" idx="10"/>
+          </p:nvPr>
+        </p:nvSpPr>
+        <p:spPr/>
+        <p:txBody>
+          <a:bodyPr/>
+          <a:lstStyle/>
+          <a:p>
+            <a:fld id="{35F06DB6-C961-486F-9CF3-1CFC1B3BA128}" type="slidenum">
+              <a:rPr lang="de-DE" smtClean="0"/>
+              <a:t>1</a:t>
+            </a:fld>
+            <a:endParaRPr lang="de-DE"/>
+          </a:p>
+        </p:txBody>
+      </p:sp>
+    </p:spTree>
+    <p:extLst>
+      <p:ext uri="{BB962C8B-B14F-4D97-AF65-F5344CB8AC3E}">
+        <p14:creationId xmlns:p14="http://schemas.microsoft.com/office/powerpoint/2010/main" val="468790488"/>
+      </p:ext>
+    </p:extLst>
+  </p:cSld>
+  <p:clrMapOvr>
+    <a:masterClrMapping/>
+  </p:clrMapOvr>
+</p:notes>
+</file>
+
+<file path=ppt/notesSlides/notesSlide2.xml><?xml version="1.0" encoding="utf-8"?>
+<p:notes xmlns:a="http://schemas.openxmlformats.org/drawingml/2006/main" xmlns:r="http://schemas.openxmlformats.org/officeDocument/2006/relationships" xmlns:p="http://schemas.openxmlformats.org/presentationml/2006/main">
+  <p:cSld>
+    <p:spTree>
+      <p:nvGrpSpPr>
+        <p:cNvPr id="1" name=""/>
+        <p:cNvGrpSpPr/>
+        <p:nvPr/>
+      </p:nvGrpSpPr>
+      <p:grpSpPr>
+        <a:xfrm>
+          <a:off x="0" y="0"/>
+          <a:ext cx="0" cy="0"/>
+          <a:chOff x="0" y="0"/>
+          <a:chExt cx="0" cy="0"/>
+        </a:xfrm>
+      </p:grpSpPr>
+      <p:sp>
+        <p:nvSpPr>
+          <p:cNvPr id="2" name="Folienbildplatzhalter 1"/>
+          <p:cNvSpPr>
+            <a:spLocks noGrp="1" noRot="1" noChangeAspect="1"/>
+          </p:cNvSpPr>
+          <p:nvPr>
+            <p:ph type="sldImg"/>
+          </p:nvPr>
+        </p:nvSpPr>
+        <p:spPr>
+          <a:xfrm>
+            <a:off x="685800" y="1143000"/>
+            <a:ext cx="5486400" cy="3086100"/>
+          </a:xfrm>
+        </p:spPr>
       </p:sp>
       <p:sp>
         <p:nvSpPr>
@@ -1078,9 +1172,9 @@
           <a:bodyPr/>
           <a:lstStyle/>
           <a:p>
-            <a:fld id="{8F87F103-FA2C-45CF-B191-CD5E49E91099}" type="datetime1">
+            <a:fld id="{4ACCBD8F-8BD5-4878-B72F-67A403A586FD}" type="datetime1">
               <a:rPr lang="en-US" smtClean="0"/>
-              <a:t>3/6/2014</a:t>
+              <a:t>3/7/2014</a:t>
             </a:fld>
             <a:endParaRPr lang="en-US" dirty="0"/>
           </a:p>
@@ -1108,7 +1202,7 @@
           <a:p>
             <a:r>
               <a:rPr lang="en-US" smtClean="0"/>
-              <a:t>Service composition - Ewen / Zipfler</a:t>
+              <a:t>Service Composition - Ewen / Zipfler</a:t>
             </a:r>
             <a:endParaRPr lang="en-US" dirty="0"/>
           </a:p>
@@ -1141,7 +1235,7 @@
     </p:spTree>
     <p:extLst>
       <p:ext uri="{BB962C8B-B14F-4D97-AF65-F5344CB8AC3E}">
-        <p14:creationId xmlns:p14="http://schemas.microsoft.com/office/powerpoint/2010/main" val="3749613463"/>
+        <p14:creationId xmlns:p14="http://schemas.microsoft.com/office/powerpoint/2010/main" val="2156469770"/>
       </p:ext>
     </p:extLst>
   </p:cSld>
@@ -1379,9 +1473,9 @@
           <a:bodyPr/>
           <a:lstStyle/>
           <a:p>
-            <a:fld id="{DE51DA25-C823-4D23-9564-0C6C8E78FC82}" type="datetime1">
+            <a:fld id="{66769744-011B-4074-B34A-5BCA902BB4A6}" type="datetime1">
               <a:rPr lang="en-US" smtClean="0"/>
-              <a:t>3/6/2014</a:t>
+              <a:t>3/7/2014</a:t>
             </a:fld>
             <a:endParaRPr lang="en-US" dirty="0"/>
           </a:p>
@@ -1404,7 +1498,7 @@
           <a:p>
             <a:r>
               <a:rPr lang="en-US" smtClean="0"/>
-              <a:t>Service composition - Ewen / Zipfler</a:t>
+              <a:t>Service Composition - Ewen / Zipfler</a:t>
             </a:r>
             <a:endParaRPr lang="en-US" dirty="0"/>
           </a:p>
@@ -1437,7 +1531,7 @@
     </p:spTree>
     <p:extLst>
       <p:ext uri="{BB962C8B-B14F-4D97-AF65-F5344CB8AC3E}">
-        <p14:creationId xmlns:p14="http://schemas.microsoft.com/office/powerpoint/2010/main" val="3822430835"/>
+        <p14:creationId xmlns:p14="http://schemas.microsoft.com/office/powerpoint/2010/main" val="980367817"/>
       </p:ext>
     </p:extLst>
   </p:cSld>
@@ -1633,9 +1727,9 @@
           <a:bodyPr/>
           <a:lstStyle/>
           <a:p>
-            <a:fld id="{DE51DA25-C823-4D23-9564-0C6C8E78FC82}" type="datetime1">
+            <a:fld id="{66769744-011B-4074-B34A-5BCA902BB4A6}" type="datetime1">
               <a:rPr lang="en-US" smtClean="0"/>
-              <a:t>3/6/2014</a:t>
+              <a:t>3/7/2014</a:t>
             </a:fld>
             <a:endParaRPr lang="en-US" dirty="0"/>
           </a:p>
@@ -1658,7 +1752,7 @@
           <a:p>
             <a:r>
               <a:rPr lang="en-US" smtClean="0"/>
-              <a:t>Service composition - Ewen / Zipfler</a:t>
+              <a:t>Service Composition - Ewen / Zipfler</a:t>
             </a:r>
             <a:endParaRPr lang="en-US" dirty="0"/>
           </a:p>
@@ -1691,7 +1785,7 @@
     </p:spTree>
     <p:extLst>
       <p:ext uri="{BB962C8B-B14F-4D97-AF65-F5344CB8AC3E}">
-        <p14:creationId xmlns:p14="http://schemas.microsoft.com/office/powerpoint/2010/main" val="3398452483"/>
+        <p14:creationId xmlns:p14="http://schemas.microsoft.com/office/powerpoint/2010/main" val="793536980"/>
       </p:ext>
     </p:extLst>
   </p:cSld>
@@ -2179,9 +2273,9 @@
           <a:bodyPr/>
           <a:lstStyle/>
           <a:p>
-            <a:fld id="{DE51DA25-C823-4D23-9564-0C6C8E78FC82}" type="datetime1">
+            <a:fld id="{66769744-011B-4074-B34A-5BCA902BB4A6}" type="datetime1">
               <a:rPr lang="en-US" smtClean="0"/>
-              <a:t>3/6/2014</a:t>
+              <a:t>3/7/2014</a:t>
             </a:fld>
             <a:endParaRPr lang="en-US" dirty="0"/>
           </a:p>
@@ -2204,7 +2298,7 @@
           <a:p>
             <a:r>
               <a:rPr lang="en-US" smtClean="0"/>
-              <a:t>Service composition - Ewen / Zipfler</a:t>
+              <a:t>Service Composition - Ewen / Zipfler</a:t>
             </a:r>
             <a:endParaRPr lang="en-US" dirty="0"/>
           </a:p>
@@ -2237,7 +2331,7 @@
     </p:spTree>
     <p:extLst>
       <p:ext uri="{BB962C8B-B14F-4D97-AF65-F5344CB8AC3E}">
-        <p14:creationId xmlns:p14="http://schemas.microsoft.com/office/powerpoint/2010/main" val="3927488063"/>
+        <p14:creationId xmlns:p14="http://schemas.microsoft.com/office/powerpoint/2010/main" val="2577558603"/>
       </p:ext>
     </p:extLst>
   </p:cSld>
@@ -2433,9 +2527,9 @@
           <a:bodyPr/>
           <a:lstStyle/>
           <a:p>
-            <a:fld id="{DE51DA25-C823-4D23-9564-0C6C8E78FC82}" type="datetime1">
+            <a:fld id="{66769744-011B-4074-B34A-5BCA902BB4A6}" type="datetime1">
               <a:rPr lang="en-US" smtClean="0"/>
-              <a:t>3/6/2014</a:t>
+              <a:t>3/7/2014</a:t>
             </a:fld>
             <a:endParaRPr lang="en-US" dirty="0"/>
           </a:p>
@@ -2458,7 +2552,7 @@
           <a:p>
             <a:r>
               <a:rPr lang="en-US" smtClean="0"/>
-              <a:t>Service composition - Ewen / Zipfler</a:t>
+              <a:t>Service Composition - Ewen / Zipfler</a:t>
             </a:r>
             <a:endParaRPr lang="en-US" dirty="0"/>
           </a:p>
@@ -2491,7 +2585,7 @@
     </p:spTree>
     <p:extLst>
       <p:ext uri="{BB962C8B-B14F-4D97-AF65-F5344CB8AC3E}">
-        <p14:creationId xmlns:p14="http://schemas.microsoft.com/office/powerpoint/2010/main" val="2142010460"/>
+        <p14:creationId xmlns:p14="http://schemas.microsoft.com/office/powerpoint/2010/main" val="2143725758"/>
       </p:ext>
     </p:extLst>
   </p:cSld>
@@ -2971,9 +3065,9 @@
           <a:bodyPr/>
           <a:lstStyle/>
           <a:p>
-            <a:fld id="{DE51DA25-C823-4D23-9564-0C6C8E78FC82}" type="datetime1">
+            <a:fld id="{66769744-011B-4074-B34A-5BCA902BB4A6}" type="datetime1">
               <a:rPr lang="en-US" smtClean="0"/>
-              <a:t>3/6/2014</a:t>
+              <a:t>3/7/2014</a:t>
             </a:fld>
             <a:endParaRPr lang="en-US" dirty="0"/>
           </a:p>
@@ -2996,7 +3090,7 @@
           <a:p>
             <a:r>
               <a:rPr lang="en-US" smtClean="0"/>
-              <a:t>Service composition - Ewen / Zipfler</a:t>
+              <a:t>Service Composition - Ewen / Zipfler</a:t>
             </a:r>
             <a:endParaRPr lang="en-US" dirty="0"/>
           </a:p>
@@ -3029,7 +3123,7 @@
     </p:spTree>
     <p:extLst>
       <p:ext uri="{BB962C8B-B14F-4D97-AF65-F5344CB8AC3E}">
-        <p14:creationId xmlns:p14="http://schemas.microsoft.com/office/powerpoint/2010/main" val="3164962364"/>
+        <p14:creationId xmlns:p14="http://schemas.microsoft.com/office/powerpoint/2010/main" val="2307840728"/>
       </p:ext>
     </p:extLst>
   </p:cSld>
@@ -3274,9 +3368,9 @@
           <a:bodyPr/>
           <a:lstStyle/>
           <a:p>
-            <a:fld id="{DE51DA25-C823-4D23-9564-0C6C8E78FC82}" type="datetime1">
+            <a:fld id="{66769744-011B-4074-B34A-5BCA902BB4A6}" type="datetime1">
               <a:rPr lang="en-US" smtClean="0"/>
-              <a:t>3/6/2014</a:t>
+              <a:t>3/7/2014</a:t>
             </a:fld>
             <a:endParaRPr lang="en-US" dirty="0"/>
           </a:p>
@@ -3299,7 +3393,7 @@
           <a:p>
             <a:r>
               <a:rPr lang="en-US" smtClean="0"/>
-              <a:t>Service composition - Ewen / Zipfler</a:t>
+              <a:t>Service Composition - Ewen / Zipfler</a:t>
             </a:r>
             <a:endParaRPr lang="en-US" dirty="0"/>
           </a:p>
@@ -3332,7 +3426,7 @@
     </p:spTree>
     <p:extLst>
       <p:ext uri="{BB962C8B-B14F-4D97-AF65-F5344CB8AC3E}">
-        <p14:creationId xmlns:p14="http://schemas.microsoft.com/office/powerpoint/2010/main" val="1816342306"/>
+        <p14:creationId xmlns:p14="http://schemas.microsoft.com/office/powerpoint/2010/main" val="1934508769"/>
       </p:ext>
     </p:extLst>
   </p:cSld>
@@ -3454,9 +3548,9 @@
           <a:bodyPr/>
           <a:lstStyle/>
           <a:p>
-            <a:fld id="{DAE8FDE7-6F24-4E5D-ABE6-4164586454D1}" type="datetime1">
+            <a:fld id="{7758BD52-2550-4FED-BC7D-7D7889CC1C10}" type="datetime1">
               <a:rPr lang="en-US" smtClean="0"/>
-              <a:t>3/6/2014</a:t>
+              <a:t>3/7/2014</a:t>
             </a:fld>
             <a:endParaRPr lang="en-US" dirty="0"/>
           </a:p>
@@ -3479,7 +3573,7 @@
           <a:p>
             <a:r>
               <a:rPr lang="en-US" smtClean="0"/>
-              <a:t>Service composition - Ewen / Zipfler</a:t>
+              <a:t>Service Composition - Ewen / Zipfler</a:t>
             </a:r>
             <a:endParaRPr lang="en-US" dirty="0"/>
           </a:p>
@@ -3512,7 +3606,7 @@
     </p:spTree>
     <p:extLst>
       <p:ext uri="{BB962C8B-B14F-4D97-AF65-F5344CB8AC3E}">
-        <p14:creationId xmlns:p14="http://schemas.microsoft.com/office/powerpoint/2010/main" val="1708710816"/>
+        <p14:creationId xmlns:p14="http://schemas.microsoft.com/office/powerpoint/2010/main" val="2491244616"/>
       </p:ext>
     </p:extLst>
   </p:cSld>
@@ -3639,9 +3733,9 @@
           <a:bodyPr/>
           <a:lstStyle/>
           <a:p>
-            <a:fld id="{E298D9F1-61A2-499C-9453-C8575A3811AC}" type="datetime1">
+            <a:fld id="{797CCC56-70E4-423A-8715-205EFC32ADE5}" type="datetime1">
               <a:rPr lang="en-US" smtClean="0"/>
-              <a:t>3/6/2014</a:t>
+              <a:t>3/7/2014</a:t>
             </a:fld>
             <a:endParaRPr lang="en-US" dirty="0"/>
           </a:p>
@@ -3664,7 +3758,7 @@
           <a:p>
             <a:r>
               <a:rPr lang="en-US" smtClean="0"/>
-              <a:t>Service composition - Ewen / Zipfler</a:t>
+              <a:t>Service Composition - Ewen / Zipfler</a:t>
             </a:r>
             <a:endParaRPr lang="en-US" dirty="0"/>
           </a:p>
@@ -3697,7 +3791,7 @@
     </p:spTree>
     <p:extLst>
       <p:ext uri="{BB962C8B-B14F-4D97-AF65-F5344CB8AC3E}">
-        <p14:creationId xmlns:p14="http://schemas.microsoft.com/office/powerpoint/2010/main" val="279739008"/>
+        <p14:creationId xmlns:p14="http://schemas.microsoft.com/office/powerpoint/2010/main" val="4087291984"/>
       </p:ext>
     </p:extLst>
   </p:cSld>
@@ -3814,9 +3908,9 @@
           <a:bodyPr/>
           <a:lstStyle/>
           <a:p>
-            <a:fld id="{67BA45D9-6C83-46E4-843A-3EDA48C70E69}" type="datetime1">
+            <a:fld id="{98E6506B-3F24-49A0-8BED-701F583E6C21}" type="datetime1">
               <a:rPr lang="en-US" smtClean="0"/>
-              <a:t>3/6/2014</a:t>
+              <a:t>3/7/2014</a:t>
             </a:fld>
             <a:endParaRPr lang="en-US" dirty="0"/>
           </a:p>
@@ -3839,7 +3933,7 @@
           <a:p>
             <a:r>
               <a:rPr lang="en-US" smtClean="0"/>
-              <a:t>Service composition - Ewen / Zipfler</a:t>
+              <a:t>Service Composition - Ewen / Zipfler</a:t>
             </a:r>
             <a:endParaRPr lang="en-US" dirty="0"/>
           </a:p>
@@ -3877,7 +3971,7 @@
     </p:spTree>
     <p:extLst>
       <p:ext uri="{BB962C8B-B14F-4D97-AF65-F5344CB8AC3E}">
-        <p14:creationId xmlns:p14="http://schemas.microsoft.com/office/powerpoint/2010/main" val="3897602581"/>
+        <p14:creationId xmlns:p14="http://schemas.microsoft.com/office/powerpoint/2010/main" val="1848659649"/>
       </p:ext>
     </p:extLst>
   </p:cSld>
@@ -4070,9 +4164,9 @@
           <a:bodyPr/>
           <a:lstStyle/>
           <a:p>
-            <a:fld id="{40D40B96-6E1E-4869-8B5E-5633A4397DC5}" type="datetime1">
+            <a:fld id="{C27FC722-9EF9-4162-A338-E425E75FF1E4}" type="datetime1">
               <a:rPr lang="en-US" smtClean="0"/>
-              <a:t>3/6/2014</a:t>
+              <a:t>3/7/2014</a:t>
             </a:fld>
             <a:endParaRPr lang="en-US" dirty="0"/>
           </a:p>
@@ -4095,7 +4189,7 @@
           <a:p>
             <a:r>
               <a:rPr lang="en-US" smtClean="0"/>
-              <a:t>Service composition - Ewen / Zipfler</a:t>
+              <a:t>Service Composition - Ewen / Zipfler</a:t>
             </a:r>
             <a:endParaRPr lang="en-US" dirty="0"/>
           </a:p>
@@ -4128,7 +4222,7 @@
     </p:spTree>
     <p:extLst>
       <p:ext uri="{BB962C8B-B14F-4D97-AF65-F5344CB8AC3E}">
-        <p14:creationId xmlns:p14="http://schemas.microsoft.com/office/powerpoint/2010/main" val="4070367843"/>
+        <p14:creationId xmlns:p14="http://schemas.microsoft.com/office/powerpoint/2010/main" val="2683381860"/>
       </p:ext>
     </p:extLst>
   </p:cSld>
@@ -4372,9 +4466,9 @@
           <a:bodyPr/>
           <a:lstStyle/>
           <a:p>
-            <a:fld id="{091DE852-FC8D-41CA-85E9-53C6AA3B1EFA}" type="datetime1">
+            <a:fld id="{D54F01B2-FDE9-41F6-B68A-C906AA4D06D7}" type="datetime1">
               <a:rPr lang="en-US" smtClean="0"/>
-              <a:t>3/6/2014</a:t>
+              <a:t>3/7/2014</a:t>
             </a:fld>
             <a:endParaRPr lang="en-US" dirty="0"/>
           </a:p>
@@ -4397,7 +4491,7 @@
           <a:p>
             <a:r>
               <a:rPr lang="en-US" smtClean="0"/>
-              <a:t>Service composition - Ewen / Zipfler</a:t>
+              <a:t>Service Composition - Ewen / Zipfler</a:t>
             </a:r>
             <a:endParaRPr lang="en-US" dirty="0"/>
           </a:p>
@@ -4430,7 +4524,7 @@
     </p:spTree>
     <p:extLst>
       <p:ext uri="{BB962C8B-B14F-4D97-AF65-F5344CB8AC3E}">
-        <p14:creationId xmlns:p14="http://schemas.microsoft.com/office/powerpoint/2010/main" val="4120053732"/>
+        <p14:creationId xmlns:p14="http://schemas.microsoft.com/office/powerpoint/2010/main" val="2996430600"/>
       </p:ext>
     </p:extLst>
   </p:cSld>
@@ -4819,9 +4913,9 @@
           <a:bodyPr/>
           <a:lstStyle/>
           <a:p>
-            <a:fld id="{03C8ECE5-D0B1-4BE6-8FEC-807A2516638B}" type="datetime1">
+            <a:fld id="{AC888BB0-A1C9-4001-83FA-B48A253950DB}" type="datetime1">
               <a:rPr lang="en-US" smtClean="0"/>
-              <a:t>3/6/2014</a:t>
+              <a:t>3/7/2014</a:t>
             </a:fld>
             <a:endParaRPr lang="en-US" dirty="0"/>
           </a:p>
@@ -4844,7 +4938,7 @@
           <a:p>
             <a:r>
               <a:rPr lang="en-US" smtClean="0"/>
-              <a:t>Service composition - Ewen / Zipfler</a:t>
+              <a:t>Service Composition - Ewen / Zipfler</a:t>
             </a:r>
             <a:endParaRPr lang="en-US" dirty="0"/>
           </a:p>
@@ -4877,7 +4971,7 @@
     </p:spTree>
     <p:extLst>
       <p:ext uri="{BB962C8B-B14F-4D97-AF65-F5344CB8AC3E}">
-        <p14:creationId xmlns:p14="http://schemas.microsoft.com/office/powerpoint/2010/main" val="1643003065"/>
+        <p14:creationId xmlns:p14="http://schemas.microsoft.com/office/powerpoint/2010/main" val="2154528250"/>
       </p:ext>
     </p:extLst>
   </p:cSld>
@@ -4942,9 +5036,9 @@
           <a:bodyPr/>
           <a:lstStyle/>
           <a:p>
-            <a:fld id="{F796FFE8-9E53-4763-B8E9-DE08E4BCFB4B}" type="datetime1">
+            <a:fld id="{07B90618-DEC0-4D1E-A31C-5B51405B78A8}" type="datetime1">
               <a:rPr lang="en-US" smtClean="0"/>
-              <a:t>3/6/2014</a:t>
+              <a:t>3/7/2014</a:t>
             </a:fld>
             <a:endParaRPr lang="en-US" dirty="0"/>
           </a:p>
@@ -4967,7 +5061,7 @@
           <a:p>
             <a:r>
               <a:rPr lang="en-US" smtClean="0"/>
-              <a:t>Service composition - Ewen / Zipfler</a:t>
+              <a:t>Service Composition - Ewen / Zipfler</a:t>
             </a:r>
             <a:endParaRPr lang="en-US" dirty="0"/>
           </a:p>
@@ -5000,7 +5094,7 @@
     </p:spTree>
     <p:extLst>
       <p:ext uri="{BB962C8B-B14F-4D97-AF65-F5344CB8AC3E}">
-        <p14:creationId xmlns:p14="http://schemas.microsoft.com/office/powerpoint/2010/main" val="3230761980"/>
+        <p14:creationId xmlns:p14="http://schemas.microsoft.com/office/powerpoint/2010/main" val="2949388670"/>
       </p:ext>
     </p:extLst>
   </p:cSld>
@@ -5042,9 +5136,9 @@
           <a:bodyPr/>
           <a:lstStyle/>
           <a:p>
-            <a:fld id="{AD17993F-FA62-47D8-B6EC-D75C89D195C4}" type="datetime1">
+            <a:fld id="{A4EBAB1F-1BAF-4ED0-A959-8FBF30BF62E5}" type="datetime1">
               <a:rPr lang="en-US" smtClean="0"/>
-              <a:t>3/6/2014</a:t>
+              <a:t>3/7/2014</a:t>
             </a:fld>
             <a:endParaRPr lang="en-US" dirty="0"/>
           </a:p>
@@ -5067,7 +5161,7 @@
           <a:p>
             <a:r>
               <a:rPr lang="en-US" smtClean="0"/>
-              <a:t>Service composition - Ewen / Zipfler</a:t>
+              <a:t>Service Composition - Ewen / Zipfler</a:t>
             </a:r>
             <a:endParaRPr lang="en-US" dirty="0"/>
           </a:p>
@@ -5100,7 +5194,7 @@
     </p:spTree>
     <p:extLst>
       <p:ext uri="{BB962C8B-B14F-4D97-AF65-F5344CB8AC3E}">
-        <p14:creationId xmlns:p14="http://schemas.microsoft.com/office/powerpoint/2010/main" val="3310990554"/>
+        <p14:creationId xmlns:p14="http://schemas.microsoft.com/office/powerpoint/2010/main" val="577099072"/>
       </p:ext>
     </p:extLst>
   </p:cSld>
@@ -5330,9 +5424,9 @@
           <a:bodyPr/>
           <a:lstStyle/>
           <a:p>
-            <a:fld id="{36A7A314-72E7-44F7-8CBB-58190A77F961}" type="datetime1">
+            <a:fld id="{360A64AE-B214-4A32-8DC3-AD05D1F3F6D5}" type="datetime1">
               <a:rPr lang="en-US" smtClean="0"/>
-              <a:t>3/6/2014</a:t>
+              <a:t>3/7/2014</a:t>
             </a:fld>
             <a:endParaRPr lang="en-US" dirty="0"/>
           </a:p>
@@ -5355,7 +5449,7 @@
           <a:p>
             <a:r>
               <a:rPr lang="en-US" smtClean="0"/>
-              <a:t>Service composition - Ewen / Zipfler</a:t>
+              <a:t>Service Composition - Ewen / Zipfler</a:t>
             </a:r>
             <a:endParaRPr lang="en-US" dirty="0"/>
           </a:p>
@@ -5388,7 +5482,7 @@
     </p:spTree>
     <p:extLst>
       <p:ext uri="{BB962C8B-B14F-4D97-AF65-F5344CB8AC3E}">
-        <p14:creationId xmlns:p14="http://schemas.microsoft.com/office/powerpoint/2010/main" val="2942317613"/>
+        <p14:creationId xmlns:p14="http://schemas.microsoft.com/office/powerpoint/2010/main" val="1218039251"/>
       </p:ext>
     </p:extLst>
   </p:cSld>
@@ -5626,9 +5720,9 @@
           <a:bodyPr/>
           <a:lstStyle/>
           <a:p>
-            <a:fld id="{F904F643-7209-491F-B0BD-1EC7AEDA8048}" type="datetime1">
+            <a:fld id="{D23061F0-A9B9-4543-A1CA-5BA651169659}" type="datetime1">
               <a:rPr lang="en-US" smtClean="0"/>
-              <a:t>3/6/2014</a:t>
+              <a:t>3/7/2014</a:t>
             </a:fld>
             <a:endParaRPr lang="en-US" dirty="0"/>
           </a:p>
@@ -5680,7 +5774,7 @@
     </p:spTree>
     <p:extLst>
       <p:ext uri="{BB962C8B-B14F-4D97-AF65-F5344CB8AC3E}">
-        <p14:creationId xmlns:p14="http://schemas.microsoft.com/office/powerpoint/2010/main" val="4286069972"/>
+        <p14:creationId xmlns:p14="http://schemas.microsoft.com/office/powerpoint/2010/main" val="3797502058"/>
       </p:ext>
     </p:extLst>
   </p:cSld>
@@ -6157,9 +6251,9 @@
             </a:lvl1pPr>
           </a:lstStyle>
           <a:p>
-            <a:fld id="{DE51DA25-C823-4D23-9564-0C6C8E78FC82}" type="datetime1">
+            <a:fld id="{66769744-011B-4074-B34A-5BCA902BB4A6}" type="datetime1">
               <a:rPr lang="en-US" smtClean="0"/>
-              <a:t>3/6/2014</a:t>
+              <a:t>3/7/2014</a:t>
             </a:fld>
             <a:endParaRPr lang="en-US" dirty="0"/>
           </a:p>
@@ -6200,7 +6294,7 @@
           <a:p>
             <a:r>
               <a:rPr lang="en-US" smtClean="0"/>
-              <a:t>Service composition - Ewen / Zipfler</a:t>
+              <a:t>Service Composition - Ewen / Zipfler</a:t>
             </a:r>
             <a:endParaRPr lang="en-US" dirty="0"/>
           </a:p>
@@ -6251,29 +6345,29 @@
     </p:spTree>
     <p:extLst>
       <p:ext uri="{BB962C8B-B14F-4D97-AF65-F5344CB8AC3E}">
-        <p14:creationId xmlns:p14="http://schemas.microsoft.com/office/powerpoint/2010/main" val="245630191"/>
+        <p14:creationId xmlns:p14="http://schemas.microsoft.com/office/powerpoint/2010/main" val="1855668554"/>
       </p:ext>
     </p:extLst>
   </p:cSld>
   <p:clrMap bg1="lt1" tx1="dk1" bg2="lt2" tx2="dk2" accent1="accent1" accent2="accent2" accent3="accent3" accent4="accent4" accent5="accent5" accent6="accent6" hlink="hlink" folHlink="folHlink"/>
   <p:sldLayoutIdLst>
-    <p:sldLayoutId id="2147483768" r:id="rId1"/>
-    <p:sldLayoutId id="2147483769" r:id="rId2"/>
-    <p:sldLayoutId id="2147483770" r:id="rId3"/>
-    <p:sldLayoutId id="2147483771" r:id="rId4"/>
-    <p:sldLayoutId id="2147483772" r:id="rId5"/>
-    <p:sldLayoutId id="2147483773" r:id="rId6"/>
-    <p:sldLayoutId id="2147483774" r:id="rId7"/>
-    <p:sldLayoutId id="2147483775" r:id="rId8"/>
-    <p:sldLayoutId id="2147483776" r:id="rId9"/>
-    <p:sldLayoutId id="2147483777" r:id="rId10"/>
-    <p:sldLayoutId id="2147483778" r:id="rId11"/>
-    <p:sldLayoutId id="2147483779" r:id="rId12"/>
-    <p:sldLayoutId id="2147483780" r:id="rId13"/>
-    <p:sldLayoutId id="2147483781" r:id="rId14"/>
-    <p:sldLayoutId id="2147483782" r:id="rId15"/>
-    <p:sldLayoutId id="2147483783" r:id="rId16"/>
-    <p:sldLayoutId id="2147483784" r:id="rId17"/>
+    <p:sldLayoutId id="2147484089" r:id="rId1"/>
+    <p:sldLayoutId id="2147484090" r:id="rId2"/>
+    <p:sldLayoutId id="2147484091" r:id="rId3"/>
+    <p:sldLayoutId id="2147484092" r:id="rId4"/>
+    <p:sldLayoutId id="2147484093" r:id="rId5"/>
+    <p:sldLayoutId id="2147484094" r:id="rId6"/>
+    <p:sldLayoutId id="2147484095" r:id="rId7"/>
+    <p:sldLayoutId id="2147484096" r:id="rId8"/>
+    <p:sldLayoutId id="2147484097" r:id="rId9"/>
+    <p:sldLayoutId id="2147484098" r:id="rId10"/>
+    <p:sldLayoutId id="2147484099" r:id="rId11"/>
+    <p:sldLayoutId id="2147484100" r:id="rId12"/>
+    <p:sldLayoutId id="2147484101" r:id="rId13"/>
+    <p:sldLayoutId id="2147484102" r:id="rId14"/>
+    <p:sldLayoutId id="2147484103" r:id="rId15"/>
+    <p:sldLayoutId id="2147484104" r:id="rId16"/>
+    <p:sldLayoutId id="2147484105" r:id="rId17"/>
   </p:sldLayoutIdLst>
   <p:hf hdr="0" dt="0"/>
   <p:txStyles>
@@ -6717,7 +6811,7 @@
             </a:r>
             <a:r>
               <a:rPr lang="de-DE" dirty="0" err="1" smtClean="0"/>
-              <a:t>composition</a:t>
+              <a:t>Composition</a:t>
             </a:r>
             <a:endParaRPr lang="de-DE" dirty="0"/>
           </a:p>
@@ -6808,14 +6902,12 @@
         </p:nvSpPr>
         <p:spPr/>
         <p:txBody>
-          <a:bodyPr>
-            <a:normAutofit/>
-          </a:bodyPr>
+          <a:bodyPr/>
           <a:lstStyle/>
           <a:p>
             <a:r>
               <a:rPr lang="de-DE" dirty="0" smtClean="0"/>
-              <a:t>Falls Fragen aufgekommen sind, können diese nun gestellt werden</a:t>
+              <a:t>Live Demonstration</a:t>
             </a:r>
             <a:endParaRPr lang="de-DE" dirty="0"/>
           </a:p>
@@ -6836,7 +6928,7 @@
           <a:bodyPr/>
           <a:lstStyle/>
           <a:p>
-            <a:endParaRPr lang="de-DE" dirty="0"/>
+            <a:endParaRPr lang="de-DE"/>
           </a:p>
         </p:txBody>
       </p:sp>
@@ -6857,7 +6949,7 @@
           <a:p>
             <a:r>
               <a:rPr lang="en-US" smtClean="0"/>
-              <a:t>Service composition - Ewen / Zipfler</a:t>
+              <a:t>Service Composition - Ewen / Zipfler</a:t>
             </a:r>
             <a:endParaRPr lang="en-US" dirty="0"/>
           </a:p>
@@ -6890,7 +6982,7 @@
     </p:spTree>
     <p:extLst>
       <p:ext uri="{BB962C8B-B14F-4D97-AF65-F5344CB8AC3E}">
-        <p14:creationId xmlns:p14="http://schemas.microsoft.com/office/powerpoint/2010/main" val="2342025019"/>
+        <p14:creationId xmlns:p14="http://schemas.microsoft.com/office/powerpoint/2010/main" val="1611649230"/>
       </p:ext>
     </p:extLst>
   </p:cSld>
@@ -6987,7 +7079,7 @@
           <a:p>
             <a:r>
               <a:rPr lang="en-US" smtClean="0"/>
-              <a:t>Service composition - Ewen / Zipfler</a:t>
+              <a:t>Service Composition - Ewen / Zipfler</a:t>
             </a:r>
             <a:endParaRPr lang="en-US" dirty="0"/>
           </a:p>
@@ -7064,7 +7156,12 @@
             <p:ph type="title"/>
           </p:nvPr>
         </p:nvSpPr>
-        <p:spPr/>
+        <p:spPr>
+          <a:xfrm>
+            <a:off x="1484311" y="685800"/>
+            <a:ext cx="10018713" cy="1752599"/>
+          </a:xfrm>
+        </p:spPr>
         <p:txBody>
           <a:bodyPr/>
           <a:lstStyle/>
@@ -7092,18 +7189,21 @@
           <a:bodyPr/>
           <a:lstStyle/>
           <a:p>
+            <a:pPr marL="261938" indent="-261938"/>
             <a:r>
               <a:rPr lang="de-DE" dirty="0" smtClean="0"/>
               <a:t>Theoretisches</a:t>
             </a:r>
           </a:p>
           <a:p>
+            <a:pPr marL="261938" indent="-261938"/>
             <a:r>
               <a:rPr lang="de-DE" dirty="0" smtClean="0"/>
               <a:t>Implementierung</a:t>
             </a:r>
           </a:p>
           <a:p>
+            <a:pPr marL="261938" indent="-261938"/>
             <a:r>
               <a:rPr lang="de-DE" dirty="0" smtClean="0"/>
               <a:t>Live Demonstration</a:t>
@@ -7129,7 +7229,7 @@
           <a:p>
             <a:r>
               <a:rPr lang="en-US" smtClean="0"/>
-              <a:t>Service composition - Ewen / Zipfler</a:t>
+              <a:t>Service Composition - Ewen / Zipfler</a:t>
             </a:r>
             <a:endParaRPr lang="en-US" dirty="0"/>
           </a:p>
@@ -7259,7 +7359,7 @@
           <a:p>
             <a:r>
               <a:rPr lang="en-US" smtClean="0"/>
-              <a:t>Service composition - Ewen / Zipfler</a:t>
+              <a:t>Service Composition - Ewen / Zipfler</a:t>
             </a:r>
             <a:endParaRPr lang="en-US" dirty="0"/>
           </a:p>
@@ -7485,7 +7585,7 @@
           <a:p>
             <a:r>
               <a:rPr lang="en-US" smtClean="0"/>
-              <a:t>Service composition - Ewen / Zipfler</a:t>
+              <a:t>Service Composition - Ewen / Zipfler</a:t>
             </a:r>
             <a:endParaRPr lang="en-US" dirty="0"/>
           </a:p>
@@ -7569,7 +7669,7 @@
           <a:p>
             <a:r>
               <a:rPr lang="de-DE" dirty="0" smtClean="0"/>
-              <a:t>Implementierung</a:t>
+              <a:t>Begriffserklärung</a:t>
             </a:r>
             <a:endParaRPr lang="de-DE" dirty="0"/>
           </a:p>
@@ -7577,12 +7677,12 @@
       </p:sp>
       <p:sp>
         <p:nvSpPr>
-          <p:cNvPr id="3" name="Textplatzhalter 2"/>
-          <p:cNvSpPr>
-            <a:spLocks noGrp="1"/>
-          </p:cNvSpPr>
-          <p:nvPr>
-            <p:ph type="body" idx="1"/>
+          <p:cNvPr id="3" name="Inhaltsplatzhalter 2"/>
+          <p:cNvSpPr>
+            <a:spLocks noGrp="1"/>
+          </p:cNvSpPr>
+          <p:nvPr>
+            <p:ph idx="1"/>
           </p:nvPr>
         </p:nvSpPr>
         <p:spPr/>
@@ -7592,10 +7692,48 @@
           <a:p>
             <a:r>
               <a:rPr lang="de-DE" dirty="0" smtClean="0"/>
-              <a:t>Was wurde wie implementiert?</a:t>
+              <a:t>Registry</a:t>
+            </a:r>
+          </a:p>
+          <a:p>
+            <a:pPr lvl="1"/>
+            <a:r>
+              <a:rPr lang="de-DE" dirty="0" smtClean="0"/>
+              <a:t>Enthält Liste aller Services</a:t>
+            </a:r>
+          </a:p>
+          <a:p>
+            <a:r>
+              <a:rPr lang="de-DE" dirty="0" smtClean="0"/>
+              <a:t>Service </a:t>
+            </a:r>
+            <a:r>
+              <a:rPr lang="de-DE" dirty="0" err="1" smtClean="0"/>
+              <a:t>Contract</a:t>
             </a:r>
             <a:endParaRPr lang="de-DE" dirty="0"/>
           </a:p>
+          <a:p>
+            <a:pPr lvl="1"/>
+            <a:r>
+              <a:rPr lang="de-DE" dirty="0" smtClean="0"/>
+              <a:t>Benötigte Parameter</a:t>
+            </a:r>
+          </a:p>
+          <a:p>
+            <a:pPr lvl="1"/>
+            <a:r>
+              <a:rPr lang="de-DE" dirty="0" smtClean="0"/>
+              <a:t>Rückgabewerte</a:t>
+            </a:r>
+          </a:p>
+          <a:p>
+            <a:pPr lvl="1"/>
+            <a:r>
+              <a:rPr lang="de-DE" dirty="0" smtClean="0"/>
+              <a:t>Beschreibung</a:t>
+            </a:r>
+          </a:p>
         </p:txBody>
       </p:sp>
       <p:sp>
@@ -7615,7 +7753,7 @@
           <a:p>
             <a:r>
               <a:rPr lang="en-US" smtClean="0"/>
-              <a:t>Service composition - Ewen / Zipfler</a:t>
+              <a:t>Service Composition - Ewen / Zipfler</a:t>
             </a:r>
             <a:endParaRPr lang="en-US" dirty="0"/>
           </a:p>
@@ -7648,7 +7786,7 @@
     </p:spTree>
     <p:extLst>
       <p:ext uri="{BB962C8B-B14F-4D97-AF65-F5344CB8AC3E}">
-        <p14:creationId xmlns:p14="http://schemas.microsoft.com/office/powerpoint/2010/main" val="4051327254"/>
+        <p14:creationId xmlns:p14="http://schemas.microsoft.com/office/powerpoint/2010/main" val="1301120679"/>
       </p:ext>
     </p:extLst>
   </p:cSld>
@@ -7684,7 +7822,7 @@
       </p:grpSpPr>
       <p:sp>
         <p:nvSpPr>
-          <p:cNvPr id="4" name="Titel 3"/>
+          <p:cNvPr id="2" name="Titel 1"/>
           <p:cNvSpPr>
             <a:spLocks noGrp="1"/>
           </p:cNvSpPr>
@@ -7699,7 +7837,7 @@
           <a:p>
             <a:r>
               <a:rPr lang="de-DE" dirty="0" smtClean="0"/>
-              <a:t>Grundsätzliches</a:t>
+              <a:t>Implementierung</a:t>
             </a:r>
             <a:endParaRPr lang="de-DE" dirty="0"/>
           </a:p>
@@ -7707,12 +7845,12 @@
       </p:sp>
       <p:sp>
         <p:nvSpPr>
-          <p:cNvPr id="5" name="Inhaltsplatzhalter 4"/>
-          <p:cNvSpPr>
-            <a:spLocks noGrp="1"/>
-          </p:cNvSpPr>
-          <p:nvPr>
-            <p:ph idx="1"/>
+          <p:cNvPr id="3" name="Textplatzhalter 2"/>
+          <p:cNvSpPr>
+            <a:spLocks noGrp="1"/>
+          </p:cNvSpPr>
+          <p:nvPr>
+            <p:ph type="body" idx="1"/>
           </p:nvPr>
         </p:nvSpPr>
         <p:spPr/>
@@ -7722,33 +7860,7 @@
           <a:p>
             <a:r>
               <a:rPr lang="de-DE" dirty="0" smtClean="0"/>
-              <a:t>GO als verwendete Programmiersprache</a:t>
-            </a:r>
-          </a:p>
-          <a:p>
-            <a:pPr lvl="1"/>
-            <a:r>
-              <a:rPr lang="de-DE" dirty="0" smtClean="0"/>
-              <a:t>Entwickelt zum erstellen von Webservices</a:t>
-            </a:r>
-          </a:p>
-          <a:p>
-            <a:r>
-              <a:rPr lang="de-DE" dirty="0" smtClean="0"/>
-              <a:t>GIT als Versionskontrollsystem</a:t>
-            </a:r>
-          </a:p>
-          <a:p>
-            <a:r>
-              <a:rPr lang="de-DE" dirty="0" smtClean="0"/>
-              <a:t>Erweiterbares Konzept</a:t>
-            </a:r>
-          </a:p>
-          <a:p>
-            <a:pPr lvl="1"/>
-            <a:r>
-              <a:rPr lang="de-DE" dirty="0" smtClean="0"/>
-              <a:t>Und Realisierung</a:t>
+              <a:t>Was wurde wie implementiert?</a:t>
             </a:r>
             <a:endParaRPr lang="de-DE" dirty="0"/>
           </a:p>
@@ -7756,7 +7868,7 @@
       </p:sp>
       <p:sp>
         <p:nvSpPr>
-          <p:cNvPr id="2" name="Fußzeilenplatzhalter 1"/>
+          <p:cNvPr id="4" name="Fußzeilenplatzhalter 3"/>
           <p:cNvSpPr>
             <a:spLocks noGrp="1"/>
           </p:cNvSpPr>
@@ -7771,15 +7883,15 @@
           <a:p>
             <a:r>
               <a:rPr lang="en-US" smtClean="0"/>
-              <a:t>Service composition - Ewen / Zipfler</a:t>
-            </a:r>
-            <a:endParaRPr lang="en-US" dirty="0"/>
-          </a:p>
-        </p:txBody>
-      </p:sp>
-      <p:sp>
-        <p:nvSpPr>
-          <p:cNvPr id="3" name="Foliennummernplatzhalter 2"/>
+              <a:t>Service Composition - Ewen / Zipfler</a:t>
+            </a:r>
+            <a:endParaRPr lang="en-US" dirty="0"/>
+          </a:p>
+        </p:txBody>
+      </p:sp>
+      <p:sp>
+        <p:nvSpPr>
+          <p:cNvPr id="5" name="Foliennummernplatzhalter 4"/>
           <p:cNvSpPr>
             <a:spLocks noGrp="1"/>
           </p:cNvSpPr>
@@ -7804,7 +7916,7 @@
     </p:spTree>
     <p:extLst>
       <p:ext uri="{BB962C8B-B14F-4D97-AF65-F5344CB8AC3E}">
-        <p14:creationId xmlns:p14="http://schemas.microsoft.com/office/powerpoint/2010/main" val="1718522615"/>
+        <p14:creationId xmlns:p14="http://schemas.microsoft.com/office/powerpoint/2010/main" val="4051327254"/>
       </p:ext>
     </p:extLst>
   </p:cSld>
@@ -7840,6 +7952,88 @@
       </p:grpSpPr>
       <p:sp>
         <p:nvSpPr>
+          <p:cNvPr id="4" name="Titel 3"/>
+          <p:cNvSpPr>
+            <a:spLocks noGrp="1"/>
+          </p:cNvSpPr>
+          <p:nvPr>
+            <p:ph type="title"/>
+          </p:nvPr>
+        </p:nvSpPr>
+        <p:spPr/>
+        <p:txBody>
+          <a:bodyPr/>
+          <a:lstStyle/>
+          <a:p>
+            <a:r>
+              <a:rPr lang="de-DE" dirty="0" smtClean="0"/>
+              <a:t>Grundsätzliches</a:t>
+            </a:r>
+            <a:endParaRPr lang="de-DE" dirty="0"/>
+          </a:p>
+        </p:txBody>
+      </p:sp>
+      <p:sp>
+        <p:nvSpPr>
+          <p:cNvPr id="5" name="Inhaltsplatzhalter 4"/>
+          <p:cNvSpPr>
+            <a:spLocks noGrp="1"/>
+          </p:cNvSpPr>
+          <p:nvPr>
+            <p:ph idx="1"/>
+          </p:nvPr>
+        </p:nvSpPr>
+        <p:spPr/>
+        <p:txBody>
+          <a:bodyPr/>
+          <a:lstStyle/>
+          <a:p>
+            <a:r>
+              <a:rPr lang="de-DE" dirty="0" smtClean="0"/>
+              <a:t>GO als verwendete Programmiersprache</a:t>
+            </a:r>
+          </a:p>
+          <a:p>
+            <a:pPr lvl="1"/>
+            <a:r>
+              <a:rPr lang="de-DE" dirty="0" smtClean="0"/>
+              <a:t>Entwickelt zum erstellen von Webservices</a:t>
+            </a:r>
+          </a:p>
+          <a:p>
+            <a:r>
+              <a:rPr lang="de-DE" dirty="0" smtClean="0"/>
+              <a:t>GIT als Versionskontrollsystem</a:t>
+            </a:r>
+          </a:p>
+          <a:p>
+            <a:r>
+              <a:rPr lang="de-DE" dirty="0" smtClean="0"/>
+              <a:t>Erweiterbares Konzept</a:t>
+            </a:r>
+          </a:p>
+          <a:p>
+            <a:pPr lvl="1"/>
+            <a:r>
+              <a:rPr lang="de-DE" dirty="0" smtClean="0"/>
+              <a:t>Und </a:t>
+            </a:r>
+            <a:r>
+              <a:rPr lang="de-DE" dirty="0" smtClean="0"/>
+              <a:t>Realisierung</a:t>
+            </a:r>
+          </a:p>
+          <a:p>
+            <a:r>
+              <a:rPr lang="de-DE" dirty="0" smtClean="0"/>
+              <a:t>Registry erreichbar über Multicast</a:t>
+            </a:r>
+            <a:endParaRPr lang="de-DE" dirty="0"/>
+          </a:p>
+        </p:txBody>
+      </p:sp>
+      <p:sp>
+        <p:nvSpPr>
           <p:cNvPr id="2" name="Fußzeilenplatzhalter 1"/>
           <p:cNvSpPr>
             <a:spLocks noGrp="1"/>
@@ -7855,7 +8049,7 @@
           <a:p>
             <a:r>
               <a:rPr lang="en-US" smtClean="0"/>
-              <a:t>Service composition - Ewen / Zipfler</a:t>
+              <a:t>Service Composition - Ewen / Zipfler</a:t>
             </a:r>
             <a:endParaRPr lang="en-US" dirty="0"/>
           </a:p>
@@ -7885,40 +8079,10 @@
           </a:p>
         </p:txBody>
       </p:sp>
-      <p:pic>
-        <p:nvPicPr>
-          <p:cNvPr id="4" name="Grafik 3"/>
-          <p:cNvPicPr>
-            <a:picLocks noChangeAspect="1"/>
-          </p:cNvPicPr>
-          <p:nvPr/>
-        </p:nvPicPr>
-        <p:blipFill>
-          <a:blip r:embed="rId2">
-            <a:extLst>
-              <a:ext uri="{28A0092B-C50C-407E-A947-70E740481C1C}">
-                <a14:useLocalDpi xmlns:a14="http://schemas.microsoft.com/office/drawing/2010/main" val="0"/>
-              </a:ext>
-            </a:extLst>
-          </a:blip>
-          <a:stretch>
-            <a:fillRect/>
-          </a:stretch>
-        </p:blipFill>
-        <p:spPr>
-          <a:xfrm>
-            <a:off x="2408625" y="1286916"/>
-            <a:ext cx="7411484" cy="3905795"/>
-          </a:xfrm>
-          <a:prstGeom prst="rect">
-            <a:avLst/>
-          </a:prstGeom>
-        </p:spPr>
-      </p:pic>
     </p:spTree>
     <p:extLst>
       <p:ext uri="{BB962C8B-B14F-4D97-AF65-F5344CB8AC3E}">
-        <p14:creationId xmlns:p14="http://schemas.microsoft.com/office/powerpoint/2010/main" val="2406769158"/>
+        <p14:creationId xmlns:p14="http://schemas.microsoft.com/office/powerpoint/2010/main" val="1718522615"/>
       </p:ext>
     </p:extLst>
   </p:cSld>
@@ -7969,7 +8133,7 @@
           <a:p>
             <a:r>
               <a:rPr lang="en-US" smtClean="0"/>
-              <a:t>Service composition - Ewen / Zipfler</a:t>
+              <a:t>Service Composition - Ewen / Zipfler</a:t>
             </a:r>
             <a:endParaRPr lang="en-US" dirty="0"/>
           </a:p>
@@ -7994,6 +8158,179 @@
               <a:rPr lang="en-US" smtClean="0"/>
               <a:pPr/>
               <a:t>8</a:t>
+            </a:fld>
+            <a:endParaRPr lang="en-US" dirty="0"/>
+          </a:p>
+        </p:txBody>
+      </p:sp>
+      <p:pic>
+        <p:nvPicPr>
+          <p:cNvPr id="5" name="Grafik 4"/>
+          <p:cNvPicPr>
+            <a:picLocks noChangeAspect="1"/>
+          </p:cNvPicPr>
+          <p:nvPr/>
+        </p:nvPicPr>
+        <p:blipFill>
+          <a:blip r:embed="rId2">
+            <a:extLst>
+              <a:ext uri="{28A0092B-C50C-407E-A947-70E740481C1C}">
+                <a14:useLocalDpi xmlns:a14="http://schemas.microsoft.com/office/drawing/2010/main" val="0"/>
+              </a:ext>
+            </a:extLst>
+          </a:blip>
+          <a:stretch>
+            <a:fillRect/>
+          </a:stretch>
+        </p:blipFill>
+        <p:spPr>
+          <a:xfrm>
+            <a:off x="1931947" y="1303020"/>
+            <a:ext cx="8364839" cy="4139413"/>
+          </a:xfrm>
+          <a:prstGeom prst="rect">
+            <a:avLst/>
+          </a:prstGeom>
+        </p:spPr>
+      </p:pic>
+    </p:spTree>
+    <p:extLst>
+      <p:ext uri="{BB962C8B-B14F-4D97-AF65-F5344CB8AC3E}">
+        <p14:creationId xmlns:p14="http://schemas.microsoft.com/office/powerpoint/2010/main" val="2406769158"/>
+      </p:ext>
+    </p:extLst>
+  </p:cSld>
+  <p:clrMapOvr>
+    <a:masterClrMapping/>
+  </p:clrMapOvr>
+  <p:timing>
+    <p:tnLst>
+      <p:par>
+        <p:cTn id="1" dur="indefinite" restart="never" nodeType="tmRoot">
+          <p:childTnLst>
+            <p:seq concurrent="1" nextAc="seek">
+              <p:cTn id="2" dur="indefinite" nodeType="mainSeq">
+                <p:childTnLst>
+                  <p:par>
+                    <p:cTn id="3" fill="hold">
+                      <p:stCondLst>
+                        <p:cond delay="indefinite"/>
+                      </p:stCondLst>
+                      <p:childTnLst>
+                        <p:par>
+                          <p:cTn id="4" fill="hold">
+                            <p:stCondLst>
+                              <p:cond delay="0"/>
+                            </p:stCondLst>
+                            <p:childTnLst>
+                              <p:par>
+                                <p:cTn id="5" presetID="6" presetClass="emph" presetSubtype="0" fill="hold" nodeType="clickEffect">
+                                  <p:stCondLst>
+                                    <p:cond delay="0"/>
+                                  </p:stCondLst>
+                                  <p:childTnLst>
+                                    <p:animScale>
+                                      <p:cBhvr>
+                                        <p:cTn id="6" dur="2000" fill="hold"/>
+                                        <p:tgtEl>
+                                          <p:spTgt spid="5"/>
+                                        </p:tgtEl>
+                                      </p:cBhvr>
+                                      <p:by x="150000" y="150000"/>
+                                    </p:animScale>
+                                  </p:childTnLst>
+                                </p:cTn>
+                              </p:par>
+                            </p:childTnLst>
+                          </p:cTn>
+                        </p:par>
+                      </p:childTnLst>
+                    </p:cTn>
+                  </p:par>
+                </p:childTnLst>
+              </p:cTn>
+              <p:prevCondLst>
+                <p:cond evt="onPrev" delay="0">
+                  <p:tgtEl>
+                    <p:sldTgt/>
+                  </p:tgtEl>
+                </p:cond>
+              </p:prevCondLst>
+              <p:nextCondLst>
+                <p:cond evt="onNext" delay="0">
+                  <p:tgtEl>
+                    <p:sldTgt/>
+                  </p:tgtEl>
+                </p:cond>
+              </p:nextCondLst>
+            </p:seq>
+          </p:childTnLst>
+        </p:cTn>
+      </p:par>
+    </p:tnLst>
+  </p:timing>
+</p:sld>
+</file>
+
+<file path=ppt/slides/slide9.xml><?xml version="1.0" encoding="utf-8"?>
+<p:sld xmlns:a="http://schemas.openxmlformats.org/drawingml/2006/main" xmlns:r="http://schemas.openxmlformats.org/officeDocument/2006/relationships" xmlns:p="http://schemas.openxmlformats.org/presentationml/2006/main">
+  <p:cSld>
+    <p:spTree>
+      <p:nvGrpSpPr>
+        <p:cNvPr id="1" name=""/>
+        <p:cNvGrpSpPr/>
+        <p:nvPr/>
+      </p:nvGrpSpPr>
+      <p:grpSpPr>
+        <a:xfrm>
+          <a:off x="0" y="0"/>
+          <a:ext cx="0" cy="0"/>
+          <a:chOff x="0" y="0"/>
+          <a:chExt cx="0" cy="0"/>
+        </a:xfrm>
+      </p:grpSpPr>
+      <p:sp>
+        <p:nvSpPr>
+          <p:cNvPr id="2" name="Fußzeilenplatzhalter 1"/>
+          <p:cNvSpPr>
+            <a:spLocks noGrp="1"/>
+          </p:cNvSpPr>
+          <p:nvPr>
+            <p:ph type="ftr" sz="quarter" idx="11"/>
+          </p:nvPr>
+        </p:nvSpPr>
+        <p:spPr/>
+        <p:txBody>
+          <a:bodyPr/>
+          <a:lstStyle/>
+          <a:p>
+            <a:r>
+              <a:rPr lang="en-US" smtClean="0"/>
+              <a:t>Service Composition - Ewen / Zipfler</a:t>
+            </a:r>
+            <a:endParaRPr lang="en-US" dirty="0"/>
+          </a:p>
+        </p:txBody>
+      </p:sp>
+      <p:sp>
+        <p:nvSpPr>
+          <p:cNvPr id="3" name="Foliennummernplatzhalter 2"/>
+          <p:cNvSpPr>
+            <a:spLocks noGrp="1"/>
+          </p:cNvSpPr>
+          <p:nvPr>
+            <p:ph type="sldNum" sz="quarter" idx="12"/>
+          </p:nvPr>
+        </p:nvSpPr>
+        <p:spPr/>
+        <p:txBody>
+          <a:bodyPr/>
+          <a:lstStyle/>
+          <a:p>
+            <a:fld id="{D57F1E4F-1CFF-5643-939E-217C01CDF565}" type="slidenum">
+              <a:rPr lang="en-US" smtClean="0"/>
+              <a:pPr/>
+              <a:t>9</a:t>
             </a:fld>
             <a:endParaRPr lang="en-US" dirty="0"/>
           </a:p>
@@ -8021,8 +8358,8 @@
         </p:blipFill>
         <p:spPr>
           <a:xfrm>
-            <a:off x="2861811" y="1509444"/>
-            <a:ext cx="6468378" cy="3839111"/>
+            <a:off x="2902914" y="1469571"/>
+            <a:ext cx="6414801" cy="3807311"/>
           </a:xfrm>
           <a:prstGeom prst="rect">
             <a:avLst/>
@@ -8039,129 +8376,69 @@
   <p:clrMapOvr>
     <a:masterClrMapping/>
   </p:clrMapOvr>
-</p:sld>
-</file>
-
-<file path=ppt/slides/slide9.xml><?xml version="1.0" encoding="utf-8"?>
-<p:sld xmlns:a="http://schemas.openxmlformats.org/drawingml/2006/main" xmlns:r="http://schemas.openxmlformats.org/officeDocument/2006/relationships" xmlns:p="http://schemas.openxmlformats.org/presentationml/2006/main">
-  <p:cSld>
-    <p:spTree>
-      <p:nvGrpSpPr>
-        <p:cNvPr id="1" name=""/>
-        <p:cNvGrpSpPr/>
-        <p:nvPr/>
-      </p:nvGrpSpPr>
-      <p:grpSpPr>
-        <a:xfrm>
-          <a:off x="0" y="0"/>
-          <a:ext cx="0" cy="0"/>
-          <a:chOff x="0" y="0"/>
-          <a:chExt cx="0" cy="0"/>
-        </a:xfrm>
-      </p:grpSpPr>
-      <p:sp>
-        <p:nvSpPr>
-          <p:cNvPr id="2" name="Titel 1"/>
-          <p:cNvSpPr>
-            <a:spLocks noGrp="1"/>
-          </p:cNvSpPr>
-          <p:nvPr>
-            <p:ph type="title"/>
-          </p:nvPr>
-        </p:nvSpPr>
-        <p:spPr/>
-        <p:txBody>
-          <a:bodyPr/>
-          <a:lstStyle/>
-          <a:p>
-            <a:r>
-              <a:rPr lang="de-DE" dirty="0" smtClean="0"/>
-              <a:t>Live Demonstration</a:t>
-            </a:r>
-            <a:endParaRPr lang="de-DE" dirty="0"/>
-          </a:p>
-        </p:txBody>
-      </p:sp>
-      <p:sp>
-        <p:nvSpPr>
-          <p:cNvPr id="3" name="Textplatzhalter 2"/>
-          <p:cNvSpPr>
-            <a:spLocks noGrp="1"/>
-          </p:cNvSpPr>
-          <p:nvPr>
-            <p:ph type="body" idx="1"/>
-          </p:nvPr>
-        </p:nvSpPr>
-        <p:spPr/>
-        <p:txBody>
-          <a:bodyPr/>
-          <a:lstStyle/>
-          <a:p>
-            <a:endParaRPr lang="de-DE"/>
-          </a:p>
-        </p:txBody>
-      </p:sp>
-      <p:sp>
-        <p:nvSpPr>
-          <p:cNvPr id="4" name="Fußzeilenplatzhalter 3"/>
-          <p:cNvSpPr>
-            <a:spLocks noGrp="1"/>
-          </p:cNvSpPr>
-          <p:nvPr>
-            <p:ph type="ftr" sz="quarter" idx="11"/>
-          </p:nvPr>
-        </p:nvSpPr>
-        <p:spPr/>
-        <p:txBody>
-          <a:bodyPr/>
-          <a:lstStyle/>
-          <a:p>
-            <a:r>
-              <a:rPr lang="en-US" smtClean="0"/>
-              <a:t>Service composition - Ewen / Zipfler</a:t>
-            </a:r>
-            <a:endParaRPr lang="en-US" dirty="0"/>
-          </a:p>
-        </p:txBody>
-      </p:sp>
-      <p:sp>
-        <p:nvSpPr>
-          <p:cNvPr id="5" name="Foliennummernplatzhalter 4"/>
-          <p:cNvSpPr>
-            <a:spLocks noGrp="1"/>
-          </p:cNvSpPr>
-          <p:nvPr>
-            <p:ph type="sldNum" sz="quarter" idx="12"/>
-          </p:nvPr>
-        </p:nvSpPr>
-        <p:spPr/>
-        <p:txBody>
-          <a:bodyPr/>
-          <a:lstStyle/>
-          <a:p>
-            <a:fld id="{D57F1E4F-1CFF-5643-939E-217C01CDF565}" type="slidenum">
-              <a:rPr lang="en-US" smtClean="0"/>
-              <a:pPr/>
-              <a:t>9</a:t>
-            </a:fld>
-            <a:endParaRPr lang="en-US" dirty="0"/>
-          </a:p>
-        </p:txBody>
-      </p:sp>
-    </p:spTree>
-    <p:extLst>
-      <p:ext uri="{BB962C8B-B14F-4D97-AF65-F5344CB8AC3E}">
-        <p14:creationId xmlns:p14="http://schemas.microsoft.com/office/powerpoint/2010/main" val="1611649230"/>
-      </p:ext>
-    </p:extLst>
-  </p:cSld>
-  <p:clrMapOvr>
-    <a:masterClrMapping/>
-  </p:clrMapOvr>
   <p:timing>
     <p:tnLst>
       <p:par>
-        <p:cTn id="1" dur="indefinite" restart="never" nodeType="tmRoot"/>
+        <p:cTn id="1" dur="indefinite" restart="never" nodeType="tmRoot">
+          <p:childTnLst>
+            <p:seq concurrent="1" nextAc="seek">
+              <p:cTn id="2" dur="indefinite" nodeType="mainSeq">
+                <p:childTnLst>
+                  <p:par>
+                    <p:cTn id="3" fill="hold">
+                      <p:stCondLst>
+                        <p:cond delay="indefinite"/>
+                      </p:stCondLst>
+                      <p:childTnLst>
+                        <p:par>
+                          <p:cTn id="4" fill="hold">
+                            <p:stCondLst>
+                              <p:cond delay="0"/>
+                            </p:stCondLst>
+                            <p:childTnLst>
+                              <p:par>
+                                <p:cTn id="5" presetID="6" presetClass="emph" presetSubtype="0" fill="hold" nodeType="clickEffect">
+                                  <p:stCondLst>
+                                    <p:cond delay="0"/>
+                                  </p:stCondLst>
+                                  <p:childTnLst>
+                                    <p:animScale>
+                                      <p:cBhvr>
+                                        <p:cTn id="6" dur="2000" fill="hold"/>
+                                        <p:tgtEl>
+                                          <p:spTgt spid="4"/>
+                                        </p:tgtEl>
+                                      </p:cBhvr>
+                                      <p:by x="150000" y="150000"/>
+                                    </p:animScale>
+                                  </p:childTnLst>
+                                </p:cTn>
+                              </p:par>
+                            </p:childTnLst>
+                          </p:cTn>
+                        </p:par>
+                      </p:childTnLst>
+                    </p:cTn>
+                  </p:par>
+                </p:childTnLst>
+              </p:cTn>
+              <p:prevCondLst>
+                <p:cond evt="onPrev" delay="0">
+                  <p:tgtEl>
+                    <p:sldTgt/>
+                  </p:tgtEl>
+                </p:cond>
+              </p:prevCondLst>
+              <p:nextCondLst>
+                <p:cond evt="onNext" delay="0">
+                  <p:tgtEl>
+                    <p:sldTgt/>
+                  </p:tgtEl>
+                </p:cond>
+              </p:nextCondLst>
+            </p:seq>
+          </p:childTnLst>
+        </p:cTn>
       </p:par>
     </p:tnLst>
   </p:timing>

</xml_diff>